<commit_message>
removed commented code in javascript
</commit_message>
<xml_diff>
--- a/PowerPoint Persentation .pptx
+++ b/PowerPoint Persentation .pptx
@@ -1474,7 +1474,7 @@
             <a:fld id="{B61BEF0D-F0BB-DE4B-95CE-6DB70DBA9567}" type="datetimeFigureOut">
               <a:rPr lang="en-US" dirty="0"/>
               <a:pPr/>
-              <a:t>8/4/2021</a:t>
+              <a:t>8/8/2021</a:t>
             </a:fld>
             <a:endParaRPr lang="en-US" dirty="0"/>
           </a:p>
@@ -1921,7 +1921,7 @@
             <a:fld id="{B61BEF0D-F0BB-DE4B-95CE-6DB70DBA9567}" type="datetimeFigureOut">
               <a:rPr lang="en-US" dirty="0"/>
               <a:pPr/>
-              <a:t>8/4/2021</a:t>
+              <a:t>8/8/2021</a:t>
             </a:fld>
             <a:endParaRPr lang="en-US" dirty="0"/>
           </a:p>
@@ -2182,7 +2182,7 @@
             <a:fld id="{B61BEF0D-F0BB-DE4B-95CE-6DB70DBA9567}" type="datetimeFigureOut">
               <a:rPr lang="en-US" dirty="0"/>
               <a:pPr/>
-              <a:t>8/4/2021</a:t>
+              <a:t>8/8/2021</a:t>
             </a:fld>
             <a:endParaRPr lang="en-US" dirty="0"/>
           </a:p>
@@ -2501,7 +2501,7 @@
             <a:fld id="{B61BEF0D-F0BB-DE4B-95CE-6DB70DBA9567}" type="datetimeFigureOut">
               <a:rPr lang="en-US" dirty="0"/>
               <a:pPr/>
-              <a:t>8/4/2021</a:t>
+              <a:t>8/8/2021</a:t>
             </a:fld>
             <a:endParaRPr lang="en-US" dirty="0"/>
           </a:p>
@@ -2830,7 +2830,7 @@
             <a:fld id="{B61BEF0D-F0BB-DE4B-95CE-6DB70DBA9567}" type="datetimeFigureOut">
               <a:rPr lang="en-US" dirty="0"/>
               <a:pPr/>
-              <a:t>8/4/2021</a:t>
+              <a:t>8/8/2021</a:t>
             </a:fld>
             <a:endParaRPr lang="en-US" dirty="0"/>
           </a:p>
@@ -3143,7 +3143,7 @@
             <a:fld id="{B61BEF0D-F0BB-DE4B-95CE-6DB70DBA9567}" type="datetimeFigureOut">
               <a:rPr lang="en-US" dirty="0"/>
               <a:pPr/>
-              <a:t>8/4/2021</a:t>
+              <a:t>8/8/2021</a:t>
             </a:fld>
             <a:endParaRPr lang="en-US" dirty="0"/>
           </a:p>
@@ -3521,7 +3521,7 @@
             <a:fld id="{B61BEF0D-F0BB-DE4B-95CE-6DB70DBA9567}" type="datetimeFigureOut">
               <a:rPr lang="en-US" dirty="0"/>
               <a:pPr/>
-              <a:t>8/4/2021</a:t>
+              <a:t>8/8/2021</a:t>
             </a:fld>
             <a:endParaRPr lang="en-US" dirty="0"/>
           </a:p>
@@ -3706,7 +3706,7 @@
             <a:fld id="{B61BEF0D-F0BB-DE4B-95CE-6DB70DBA9567}" type="datetimeFigureOut">
               <a:rPr lang="en-US" dirty="0"/>
               <a:pPr/>
-              <a:t>8/4/2021</a:t>
+              <a:t>8/8/2021</a:t>
             </a:fld>
             <a:endParaRPr lang="en-US" dirty="0"/>
           </a:p>
@@ -3897,7 +3897,7 @@
             <a:fld id="{B61BEF0D-F0BB-DE4B-95CE-6DB70DBA9567}" type="datetimeFigureOut">
               <a:rPr lang="en-US" dirty="0"/>
               <a:pPr/>
-              <a:t>8/4/2021</a:t>
+              <a:t>8/8/2021</a:t>
             </a:fld>
             <a:endParaRPr lang="en-US" dirty="0"/>
           </a:p>
@@ -4683,7 +4683,7 @@
             <a:fld id="{B61BEF0D-F0BB-DE4B-95CE-6DB70DBA9567}" type="datetimeFigureOut">
               <a:rPr lang="en-US" dirty="0"/>
               <a:pPr/>
-              <a:t>8/4/2021</a:t>
+              <a:t>8/8/2021</a:t>
             </a:fld>
             <a:endParaRPr lang="en-US" dirty="0"/>
           </a:p>
@@ -4944,7 +4944,7 @@
             <a:fld id="{B61BEF0D-F0BB-DE4B-95CE-6DB70DBA9567}" type="datetimeFigureOut">
               <a:rPr lang="en-US" dirty="0"/>
               <a:pPr/>
-              <a:t>8/4/2021</a:t>
+              <a:t>8/8/2021</a:t>
             </a:fld>
             <a:endParaRPr lang="en-US" dirty="0"/>
           </a:p>
@@ -5191,7 +5191,7 @@
             <a:fld id="{B61BEF0D-F0BB-DE4B-95CE-6DB70DBA9567}" type="datetimeFigureOut">
               <a:rPr lang="en-US" dirty="0"/>
               <a:pPr/>
-              <a:t>8/4/2021</a:t>
+              <a:t>8/8/2021</a:t>
             </a:fld>
             <a:endParaRPr lang="en-US" dirty="0"/>
           </a:p>
@@ -5584,7 +5584,7 @@
             <a:fld id="{B61BEF0D-F0BB-DE4B-95CE-6DB70DBA9567}" type="datetimeFigureOut">
               <a:rPr lang="en-US" dirty="0"/>
               <a:pPr/>
-              <a:t>8/4/2021</a:t>
+              <a:t>8/8/2021</a:t>
             </a:fld>
             <a:endParaRPr lang="en-US" dirty="0"/>
           </a:p>
@@ -5713,7 +5713,7 @@
             <a:fld id="{B61BEF0D-F0BB-DE4B-95CE-6DB70DBA9567}" type="datetimeFigureOut">
               <a:rPr lang="en-US" dirty="0"/>
               <a:pPr/>
-              <a:t>8/4/2021</a:t>
+              <a:t>8/8/2021</a:t>
             </a:fld>
             <a:endParaRPr lang="en-US" dirty="0"/>
           </a:p>
@@ -5819,7 +5819,7 @@
             <a:fld id="{B61BEF0D-F0BB-DE4B-95CE-6DB70DBA9567}" type="datetimeFigureOut">
               <a:rPr lang="en-US" dirty="0"/>
               <a:pPr/>
-              <a:t>8/4/2021</a:t>
+              <a:t>8/8/2021</a:t>
             </a:fld>
             <a:endParaRPr lang="en-US" dirty="0"/>
           </a:p>
@@ -6084,7 +6084,7 @@
             <a:fld id="{B61BEF0D-F0BB-DE4B-95CE-6DB70DBA9567}" type="datetimeFigureOut">
               <a:rPr lang="en-US" dirty="0"/>
               <a:pPr/>
-              <a:t>8/4/2021</a:t>
+              <a:t>8/8/2021</a:t>
             </a:fld>
             <a:endParaRPr lang="en-US" dirty="0"/>
           </a:p>
@@ -6378,7 +6378,7 @@
             <a:fld id="{B61BEF0D-F0BB-DE4B-95CE-6DB70DBA9567}" type="datetimeFigureOut">
               <a:rPr lang="en-US" dirty="0"/>
               <a:pPr/>
-              <a:t>8/4/2021</a:t>
+              <a:t>8/8/2021</a:t>
             </a:fld>
             <a:endParaRPr lang="en-US" dirty="0"/>
           </a:p>
@@ -6795,7 +6795,7 @@
             <a:fld id="{B61BEF0D-F0BB-DE4B-95CE-6DB70DBA9567}" type="datetimeFigureOut">
               <a:rPr lang="en-US" dirty="0"/>
               <a:pPr/>
-              <a:t>8/4/2021</a:t>
+              <a:t>8/8/2021</a:t>
             </a:fld>
             <a:endParaRPr lang="en-US" dirty="0"/>
           </a:p>
@@ -7432,8 +7432,8 @@
           <a:p>
             <a:pPr marL="1828800" lvl="4" indent="0" algn="l"/>
             <a:r>
-              <a:rPr lang="en-US" sz="1600" b="1" dirty="0"/>
-              <a:t>Rabin Taya </a:t>
+              <a:rPr lang="en-US" sz="1600" b="1"/>
+              <a:t>Rabin Raya </a:t>
             </a:r>
             <a:r>
               <a:rPr lang="en-US" sz="1600" b="1" dirty="0" err="1"/>

</xml_diff>